<commit_message>
Added CSC-315 and CSC-450 links
</commit_message>
<xml_diff>
--- a/img/portfolio/img.pptx
+++ b/img/portfolio/img.pptx
@@ -288,7 +288,7 @@
           <a:p>
             <a:fld id="{569EC748-CAB2-0042-B9F3-3B52ABEE8ABE}" type="datetimeFigureOut">
               <a:rPr lang="en-US" smtClean="0"/>
-              <a:t>7/8/16</a:t>
+              <a:t>8/17/16</a:t>
             </a:fld>
             <a:endParaRPr lang="en-US"/>
           </a:p>
@@ -458,7 +458,7 @@
           <a:p>
             <a:fld id="{569EC748-CAB2-0042-B9F3-3B52ABEE8ABE}" type="datetimeFigureOut">
               <a:rPr lang="en-US" smtClean="0"/>
-              <a:t>7/8/16</a:t>
+              <a:t>8/17/16</a:t>
             </a:fld>
             <a:endParaRPr lang="en-US"/>
           </a:p>
@@ -638,7 +638,7 @@
           <a:p>
             <a:fld id="{569EC748-CAB2-0042-B9F3-3B52ABEE8ABE}" type="datetimeFigureOut">
               <a:rPr lang="en-US" smtClean="0"/>
-              <a:t>7/8/16</a:t>
+              <a:t>8/17/16</a:t>
             </a:fld>
             <a:endParaRPr lang="en-US"/>
           </a:p>
@@ -808,7 +808,7 @@
           <a:p>
             <a:fld id="{569EC748-CAB2-0042-B9F3-3B52ABEE8ABE}" type="datetimeFigureOut">
               <a:rPr lang="en-US" smtClean="0"/>
-              <a:t>7/8/16</a:t>
+              <a:t>8/17/16</a:t>
             </a:fld>
             <a:endParaRPr lang="en-US"/>
           </a:p>
@@ -1054,7 +1054,7 @@
           <a:p>
             <a:fld id="{569EC748-CAB2-0042-B9F3-3B52ABEE8ABE}" type="datetimeFigureOut">
               <a:rPr lang="en-US" smtClean="0"/>
-              <a:t>7/8/16</a:t>
+              <a:t>8/17/16</a:t>
             </a:fld>
             <a:endParaRPr lang="en-US"/>
           </a:p>
@@ -1342,7 +1342,7 @@
           <a:p>
             <a:fld id="{569EC748-CAB2-0042-B9F3-3B52ABEE8ABE}" type="datetimeFigureOut">
               <a:rPr lang="en-US" smtClean="0"/>
-              <a:t>7/8/16</a:t>
+              <a:t>8/17/16</a:t>
             </a:fld>
             <a:endParaRPr lang="en-US"/>
           </a:p>
@@ -1764,7 +1764,7 @@
           <a:p>
             <a:fld id="{569EC748-CAB2-0042-B9F3-3B52ABEE8ABE}" type="datetimeFigureOut">
               <a:rPr lang="en-US" smtClean="0"/>
-              <a:t>7/8/16</a:t>
+              <a:t>8/17/16</a:t>
             </a:fld>
             <a:endParaRPr lang="en-US"/>
           </a:p>
@@ -1882,7 +1882,7 @@
           <a:p>
             <a:fld id="{569EC748-CAB2-0042-B9F3-3B52ABEE8ABE}" type="datetimeFigureOut">
               <a:rPr lang="en-US" smtClean="0"/>
-              <a:t>7/8/16</a:t>
+              <a:t>8/17/16</a:t>
             </a:fld>
             <a:endParaRPr lang="en-US"/>
           </a:p>
@@ -1977,7 +1977,7 @@
           <a:p>
             <a:fld id="{569EC748-CAB2-0042-B9F3-3B52ABEE8ABE}" type="datetimeFigureOut">
               <a:rPr lang="en-US" smtClean="0"/>
-              <a:t>7/8/16</a:t>
+              <a:t>8/17/16</a:t>
             </a:fld>
             <a:endParaRPr lang="en-US"/>
           </a:p>
@@ -2254,7 +2254,7 @@
           <a:p>
             <a:fld id="{569EC748-CAB2-0042-B9F3-3B52ABEE8ABE}" type="datetimeFigureOut">
               <a:rPr lang="en-US" smtClean="0"/>
-              <a:t>7/8/16</a:t>
+              <a:t>8/17/16</a:t>
             </a:fld>
             <a:endParaRPr lang="en-US"/>
           </a:p>
@@ -2507,7 +2507,7 @@
           <a:p>
             <a:fld id="{569EC748-CAB2-0042-B9F3-3B52ABEE8ABE}" type="datetimeFigureOut">
               <a:rPr lang="en-US" smtClean="0"/>
-              <a:t>7/8/16</a:t>
+              <a:t>8/17/16</a:t>
             </a:fld>
             <a:endParaRPr lang="en-US"/>
           </a:p>
@@ -2720,7 +2720,7 @@
           <a:p>
             <a:fld id="{569EC748-CAB2-0042-B9F3-3B52ABEE8ABE}" type="datetimeFigureOut">
               <a:rPr lang="en-US" smtClean="0"/>
-              <a:t>7/8/16</a:t>
+              <a:t>8/17/16</a:t>
             </a:fld>
             <a:endParaRPr lang="en-US"/>
           </a:p>
@@ -3224,6 +3224,55 @@
           <a:lstStyle/>
           <a:p>
             <a:pPr algn="ctr"/>
+            <a:endParaRPr lang="en-US" sz="3600" b="1" dirty="0"/>
+          </a:p>
+        </p:txBody>
+      </p:sp>
+      <p:sp>
+        <p:nvSpPr>
+          <p:cNvPr id="7" name="Rectangle 6"/>
+          <p:cNvSpPr/>
+          <p:nvPr/>
+        </p:nvSpPr>
+        <p:spPr>
+          <a:xfrm>
+            <a:off x="5836666" y="3993810"/>
+            <a:ext cx="1998011" cy="1703852"/>
+          </a:xfrm>
+          <a:prstGeom prst="rect">
+            <a:avLst/>
+          </a:prstGeom>
+          <a:solidFill>
+            <a:schemeClr val="accent2"/>
+          </a:solidFill>
+        </p:spPr>
+        <p:style>
+          <a:lnRef idx="1">
+            <a:schemeClr val="accent1"/>
+          </a:lnRef>
+          <a:fillRef idx="3">
+            <a:schemeClr val="accent1"/>
+          </a:fillRef>
+          <a:effectRef idx="2">
+            <a:schemeClr val="accent1"/>
+          </a:effectRef>
+          <a:fontRef idx="minor">
+            <a:schemeClr val="lt1"/>
+          </a:fontRef>
+        </p:style>
+        <p:txBody>
+          <a:bodyPr rtlCol="0" anchor="ctr"/>
+          <a:lstStyle/>
+          <a:p>
+            <a:pPr algn="ctr"/>
+            <a:r>
+              <a:rPr lang="en-US" sz="3600" b="1" smtClean="0"/>
+              <a:t>CSC</a:t>
+            </a:r>
+            <a:r>
+              <a:rPr lang="en-US" sz="3600" b="1" smtClean="0"/>
+              <a:t>-450</a:t>
+            </a:r>
             <a:endParaRPr lang="en-US" sz="3600" b="1" dirty="0"/>
           </a:p>
         </p:txBody>

</xml_diff>

<commit_message>
Ready for Fall 2018
</commit_message>
<xml_diff>
--- a/img/portfolio/img.pptx
+++ b/img/portfolio/img.pptx
@@ -104,6 +104,22 @@
       </a:defRPr>
     </a:lvl9pPr>
   </p:defaultTextStyle>
+  <p:extLst>
+    <p:ext uri="{EFAFB233-063F-42B5-8137-9DF3F51BA10A}">
+      <p15:sldGuideLst xmlns:p15="http://schemas.microsoft.com/office/powerpoint/2012/main">
+        <p15:guide id="1" orient="horz" pos="2160">
+          <p15:clr>
+            <a:srgbClr val="A4A3A4"/>
+          </p15:clr>
+        </p15:guide>
+        <p15:guide id="2" pos="2880">
+          <p15:clr>
+            <a:srgbClr val="A4A3A4"/>
+          </p15:clr>
+        </p15:guide>
+      </p15:sldGuideLst>
+    </p:ext>
+  </p:extLst>
 </p:presentation>
 </file>
 
@@ -145,10 +161,9 @@
           <a:lstStyle/>
           <a:p>
             <a:r>
-              <a:rPr lang="en-US" smtClean="0"/>
+              <a:rPr lang="en-US"/>
               <a:t>Click to edit Master title style</a:t>
             </a:r>
-            <a:endParaRPr lang="en-US"/>
           </a:p>
         </p:txBody>
       </p:sp>
@@ -264,10 +279,9 @@
           </a:lstStyle>
           <a:p>
             <a:r>
-              <a:rPr lang="en-US" smtClean="0"/>
+              <a:rPr lang="en-US"/>
               <a:t>Click to edit Master subtitle style</a:t>
             </a:r>
-            <a:endParaRPr lang="en-US"/>
           </a:p>
         </p:txBody>
       </p:sp>
@@ -288,7 +302,7 @@
           <a:p>
             <a:fld id="{569EC748-CAB2-0042-B9F3-3B52ABEE8ABE}" type="datetimeFigureOut">
               <a:rPr lang="en-US" smtClean="0"/>
-              <a:t>1/12/17</a:t>
+              <a:t>8/21/18</a:t>
             </a:fld>
             <a:endParaRPr lang="en-US"/>
           </a:p>
@@ -382,10 +396,9 @@
           <a:lstStyle/>
           <a:p>
             <a:r>
-              <a:rPr lang="en-US" smtClean="0"/>
+              <a:rPr lang="en-US"/>
               <a:t>Click to edit Master title style</a:t>
             </a:r>
-            <a:endParaRPr lang="en-US"/>
           </a:p>
         </p:txBody>
       </p:sp>
@@ -406,38 +419,37 @@
           <a:p>
             <a:pPr lvl="0"/>
             <a:r>
-              <a:rPr lang="en-US" smtClean="0"/>
+              <a:rPr lang="en-US"/>
               <a:t>Click to edit Master text styles</a:t>
             </a:r>
           </a:p>
           <a:p>
             <a:pPr lvl="1"/>
             <a:r>
-              <a:rPr lang="en-US" smtClean="0"/>
+              <a:rPr lang="en-US"/>
               <a:t>Second level</a:t>
             </a:r>
           </a:p>
           <a:p>
             <a:pPr lvl="2"/>
             <a:r>
-              <a:rPr lang="en-US" smtClean="0"/>
+              <a:rPr lang="en-US"/>
               <a:t>Third level</a:t>
             </a:r>
           </a:p>
           <a:p>
             <a:pPr lvl="3"/>
             <a:r>
-              <a:rPr lang="en-US" smtClean="0"/>
+              <a:rPr lang="en-US"/>
               <a:t>Fourth level</a:t>
             </a:r>
           </a:p>
           <a:p>
             <a:pPr lvl="4"/>
             <a:r>
-              <a:rPr lang="en-US" smtClean="0"/>
+              <a:rPr lang="en-US"/>
               <a:t>Fifth level</a:t>
             </a:r>
-            <a:endParaRPr lang="en-US"/>
           </a:p>
         </p:txBody>
       </p:sp>
@@ -458,7 +470,7 @@
           <a:p>
             <a:fld id="{569EC748-CAB2-0042-B9F3-3B52ABEE8ABE}" type="datetimeFigureOut">
               <a:rPr lang="en-US" smtClean="0"/>
-              <a:t>1/12/17</a:t>
+              <a:t>8/21/18</a:t>
             </a:fld>
             <a:endParaRPr lang="en-US"/>
           </a:p>
@@ -557,10 +569,9 @@
           <a:lstStyle/>
           <a:p>
             <a:r>
-              <a:rPr lang="en-US" smtClean="0"/>
+              <a:rPr lang="en-US"/>
               <a:t>Click to edit Master title style</a:t>
             </a:r>
-            <a:endParaRPr lang="en-US"/>
           </a:p>
         </p:txBody>
       </p:sp>
@@ -586,38 +597,37 @@
           <a:p>
             <a:pPr lvl="0"/>
             <a:r>
-              <a:rPr lang="en-US" smtClean="0"/>
+              <a:rPr lang="en-US"/>
               <a:t>Click to edit Master text styles</a:t>
             </a:r>
           </a:p>
           <a:p>
             <a:pPr lvl="1"/>
             <a:r>
-              <a:rPr lang="en-US" smtClean="0"/>
+              <a:rPr lang="en-US"/>
               <a:t>Second level</a:t>
             </a:r>
           </a:p>
           <a:p>
             <a:pPr lvl="2"/>
             <a:r>
-              <a:rPr lang="en-US" smtClean="0"/>
+              <a:rPr lang="en-US"/>
               <a:t>Third level</a:t>
             </a:r>
           </a:p>
           <a:p>
             <a:pPr lvl="3"/>
             <a:r>
-              <a:rPr lang="en-US" smtClean="0"/>
+              <a:rPr lang="en-US"/>
               <a:t>Fourth level</a:t>
             </a:r>
           </a:p>
           <a:p>
             <a:pPr lvl="4"/>
             <a:r>
-              <a:rPr lang="en-US" smtClean="0"/>
+              <a:rPr lang="en-US"/>
               <a:t>Fifth level</a:t>
             </a:r>
-            <a:endParaRPr lang="en-US"/>
           </a:p>
         </p:txBody>
       </p:sp>
@@ -638,7 +648,7 @@
           <a:p>
             <a:fld id="{569EC748-CAB2-0042-B9F3-3B52ABEE8ABE}" type="datetimeFigureOut">
               <a:rPr lang="en-US" smtClean="0"/>
-              <a:t>1/12/17</a:t>
+              <a:t>8/21/18</a:t>
             </a:fld>
             <a:endParaRPr lang="en-US"/>
           </a:p>
@@ -732,10 +742,9 @@
           <a:lstStyle/>
           <a:p>
             <a:r>
-              <a:rPr lang="en-US" smtClean="0"/>
+              <a:rPr lang="en-US"/>
               <a:t>Click to edit Master title style</a:t>
             </a:r>
-            <a:endParaRPr lang="en-US"/>
           </a:p>
         </p:txBody>
       </p:sp>
@@ -756,38 +765,37 @@
           <a:p>
             <a:pPr lvl="0"/>
             <a:r>
-              <a:rPr lang="en-US" smtClean="0"/>
+              <a:rPr lang="en-US"/>
               <a:t>Click to edit Master text styles</a:t>
             </a:r>
           </a:p>
           <a:p>
             <a:pPr lvl="1"/>
             <a:r>
-              <a:rPr lang="en-US" smtClean="0"/>
+              <a:rPr lang="en-US"/>
               <a:t>Second level</a:t>
             </a:r>
           </a:p>
           <a:p>
             <a:pPr lvl="2"/>
             <a:r>
-              <a:rPr lang="en-US" smtClean="0"/>
+              <a:rPr lang="en-US"/>
               <a:t>Third level</a:t>
             </a:r>
           </a:p>
           <a:p>
             <a:pPr lvl="3"/>
             <a:r>
-              <a:rPr lang="en-US" smtClean="0"/>
+              <a:rPr lang="en-US"/>
               <a:t>Fourth level</a:t>
             </a:r>
           </a:p>
           <a:p>
             <a:pPr lvl="4"/>
             <a:r>
-              <a:rPr lang="en-US" smtClean="0"/>
+              <a:rPr lang="en-US"/>
               <a:t>Fifth level</a:t>
             </a:r>
-            <a:endParaRPr lang="en-US"/>
           </a:p>
         </p:txBody>
       </p:sp>
@@ -808,7 +816,7 @@
           <a:p>
             <a:fld id="{569EC748-CAB2-0042-B9F3-3B52ABEE8ABE}" type="datetimeFigureOut">
               <a:rPr lang="en-US" smtClean="0"/>
-              <a:t>1/12/17</a:t>
+              <a:t>8/21/18</a:t>
             </a:fld>
             <a:endParaRPr lang="en-US"/>
           </a:p>
@@ -911,10 +919,9 @@
           </a:lstStyle>
           <a:p>
             <a:r>
-              <a:rPr lang="en-US" smtClean="0"/>
+              <a:rPr lang="en-US"/>
               <a:t>Click to edit Master title style</a:t>
             </a:r>
-            <a:endParaRPr lang="en-US"/>
           </a:p>
         </p:txBody>
       </p:sp>
@@ -1031,7 +1038,7 @@
           <a:p>
             <a:pPr lvl="0"/>
             <a:r>
-              <a:rPr lang="en-US" smtClean="0"/>
+              <a:rPr lang="en-US"/>
               <a:t>Click to edit Master text styles</a:t>
             </a:r>
           </a:p>
@@ -1054,7 +1061,7 @@
           <a:p>
             <a:fld id="{569EC748-CAB2-0042-B9F3-3B52ABEE8ABE}" type="datetimeFigureOut">
               <a:rPr lang="en-US" smtClean="0"/>
-              <a:t>1/12/17</a:t>
+              <a:t>8/21/18</a:t>
             </a:fld>
             <a:endParaRPr lang="en-US"/>
           </a:p>
@@ -1148,10 +1155,9 @@
           <a:lstStyle/>
           <a:p>
             <a:r>
-              <a:rPr lang="en-US" smtClean="0"/>
+              <a:rPr lang="en-US"/>
               <a:t>Click to edit Master title style</a:t>
             </a:r>
-            <a:endParaRPr lang="en-US"/>
           </a:p>
         </p:txBody>
       </p:sp>
@@ -1205,38 +1211,37 @@
           <a:p>
             <a:pPr lvl="0"/>
             <a:r>
-              <a:rPr lang="en-US" smtClean="0"/>
+              <a:rPr lang="en-US"/>
               <a:t>Click to edit Master text styles</a:t>
             </a:r>
           </a:p>
           <a:p>
             <a:pPr lvl="1"/>
             <a:r>
-              <a:rPr lang="en-US" smtClean="0"/>
+              <a:rPr lang="en-US"/>
               <a:t>Second level</a:t>
             </a:r>
           </a:p>
           <a:p>
             <a:pPr lvl="2"/>
             <a:r>
-              <a:rPr lang="en-US" smtClean="0"/>
+              <a:rPr lang="en-US"/>
               <a:t>Third level</a:t>
             </a:r>
           </a:p>
           <a:p>
             <a:pPr lvl="3"/>
             <a:r>
-              <a:rPr lang="en-US" smtClean="0"/>
+              <a:rPr lang="en-US"/>
               <a:t>Fourth level</a:t>
             </a:r>
           </a:p>
           <a:p>
             <a:pPr lvl="4"/>
             <a:r>
-              <a:rPr lang="en-US" smtClean="0"/>
+              <a:rPr lang="en-US"/>
               <a:t>Fifth level</a:t>
             </a:r>
-            <a:endParaRPr lang="en-US"/>
           </a:p>
         </p:txBody>
       </p:sp>
@@ -1290,38 +1295,37 @@
           <a:p>
             <a:pPr lvl="0"/>
             <a:r>
-              <a:rPr lang="en-US" smtClean="0"/>
+              <a:rPr lang="en-US"/>
               <a:t>Click to edit Master text styles</a:t>
             </a:r>
           </a:p>
           <a:p>
             <a:pPr lvl="1"/>
             <a:r>
-              <a:rPr lang="en-US" smtClean="0"/>
+              <a:rPr lang="en-US"/>
               <a:t>Second level</a:t>
             </a:r>
           </a:p>
           <a:p>
             <a:pPr lvl="2"/>
             <a:r>
-              <a:rPr lang="en-US" smtClean="0"/>
+              <a:rPr lang="en-US"/>
               <a:t>Third level</a:t>
             </a:r>
           </a:p>
           <a:p>
             <a:pPr lvl="3"/>
             <a:r>
-              <a:rPr lang="en-US" smtClean="0"/>
+              <a:rPr lang="en-US"/>
               <a:t>Fourth level</a:t>
             </a:r>
           </a:p>
           <a:p>
             <a:pPr lvl="4"/>
             <a:r>
-              <a:rPr lang="en-US" smtClean="0"/>
+              <a:rPr lang="en-US"/>
               <a:t>Fifth level</a:t>
             </a:r>
-            <a:endParaRPr lang="en-US"/>
           </a:p>
         </p:txBody>
       </p:sp>
@@ -1342,7 +1346,7 @@
           <a:p>
             <a:fld id="{569EC748-CAB2-0042-B9F3-3B52ABEE8ABE}" type="datetimeFigureOut">
               <a:rPr lang="en-US" smtClean="0"/>
-              <a:t>1/12/17</a:t>
+              <a:t>8/21/18</a:t>
             </a:fld>
             <a:endParaRPr lang="en-US"/>
           </a:p>
@@ -1440,10 +1444,9 @@
           </a:lstStyle>
           <a:p>
             <a:r>
-              <a:rPr lang="en-US" smtClean="0"/>
+              <a:rPr lang="en-US"/>
               <a:t>Click to edit Master title style</a:t>
             </a:r>
-            <a:endParaRPr lang="en-US"/>
           </a:p>
         </p:txBody>
       </p:sp>
@@ -1506,7 +1509,7 @@
           <a:p>
             <a:pPr lvl="0"/>
             <a:r>
-              <a:rPr lang="en-US" smtClean="0"/>
+              <a:rPr lang="en-US"/>
               <a:t>Click to edit Master text styles</a:t>
             </a:r>
           </a:p>
@@ -1562,38 +1565,37 @@
           <a:p>
             <a:pPr lvl="0"/>
             <a:r>
-              <a:rPr lang="en-US" smtClean="0"/>
+              <a:rPr lang="en-US"/>
               <a:t>Click to edit Master text styles</a:t>
             </a:r>
           </a:p>
           <a:p>
             <a:pPr lvl="1"/>
             <a:r>
-              <a:rPr lang="en-US" smtClean="0"/>
+              <a:rPr lang="en-US"/>
               <a:t>Second level</a:t>
             </a:r>
           </a:p>
           <a:p>
             <a:pPr lvl="2"/>
             <a:r>
-              <a:rPr lang="en-US" smtClean="0"/>
+              <a:rPr lang="en-US"/>
               <a:t>Third level</a:t>
             </a:r>
           </a:p>
           <a:p>
             <a:pPr lvl="3"/>
             <a:r>
-              <a:rPr lang="en-US" smtClean="0"/>
+              <a:rPr lang="en-US"/>
               <a:t>Fourth level</a:t>
             </a:r>
           </a:p>
           <a:p>
             <a:pPr lvl="4"/>
             <a:r>
-              <a:rPr lang="en-US" smtClean="0"/>
+              <a:rPr lang="en-US"/>
               <a:t>Fifth level</a:t>
             </a:r>
-            <a:endParaRPr lang="en-US"/>
           </a:p>
         </p:txBody>
       </p:sp>
@@ -1656,7 +1658,7 @@
           <a:p>
             <a:pPr lvl="0"/>
             <a:r>
-              <a:rPr lang="en-US" smtClean="0"/>
+              <a:rPr lang="en-US"/>
               <a:t>Click to edit Master text styles</a:t>
             </a:r>
           </a:p>
@@ -1712,38 +1714,37 @@
           <a:p>
             <a:pPr lvl="0"/>
             <a:r>
-              <a:rPr lang="en-US" smtClean="0"/>
+              <a:rPr lang="en-US"/>
               <a:t>Click to edit Master text styles</a:t>
             </a:r>
           </a:p>
           <a:p>
             <a:pPr lvl="1"/>
             <a:r>
-              <a:rPr lang="en-US" smtClean="0"/>
+              <a:rPr lang="en-US"/>
               <a:t>Second level</a:t>
             </a:r>
           </a:p>
           <a:p>
             <a:pPr lvl="2"/>
             <a:r>
-              <a:rPr lang="en-US" smtClean="0"/>
+              <a:rPr lang="en-US"/>
               <a:t>Third level</a:t>
             </a:r>
           </a:p>
           <a:p>
             <a:pPr lvl="3"/>
             <a:r>
-              <a:rPr lang="en-US" smtClean="0"/>
+              <a:rPr lang="en-US"/>
               <a:t>Fourth level</a:t>
             </a:r>
           </a:p>
           <a:p>
             <a:pPr lvl="4"/>
             <a:r>
-              <a:rPr lang="en-US" smtClean="0"/>
+              <a:rPr lang="en-US"/>
               <a:t>Fifth level</a:t>
             </a:r>
-            <a:endParaRPr lang="en-US"/>
           </a:p>
         </p:txBody>
       </p:sp>
@@ -1764,7 +1765,7 @@
           <a:p>
             <a:fld id="{569EC748-CAB2-0042-B9F3-3B52ABEE8ABE}" type="datetimeFigureOut">
               <a:rPr lang="en-US" smtClean="0"/>
-              <a:t>1/12/17</a:t>
+              <a:t>8/21/18</a:t>
             </a:fld>
             <a:endParaRPr lang="en-US"/>
           </a:p>
@@ -1858,10 +1859,9 @@
           <a:lstStyle/>
           <a:p>
             <a:r>
-              <a:rPr lang="en-US" smtClean="0"/>
+              <a:rPr lang="en-US"/>
               <a:t>Click to edit Master title style</a:t>
             </a:r>
-            <a:endParaRPr lang="en-US"/>
           </a:p>
         </p:txBody>
       </p:sp>
@@ -1882,7 +1882,7 @@
           <a:p>
             <a:fld id="{569EC748-CAB2-0042-B9F3-3B52ABEE8ABE}" type="datetimeFigureOut">
               <a:rPr lang="en-US" smtClean="0"/>
-              <a:t>1/12/17</a:t>
+              <a:t>8/21/18</a:t>
             </a:fld>
             <a:endParaRPr lang="en-US"/>
           </a:p>
@@ -1977,7 +1977,7 @@
           <a:p>
             <a:fld id="{569EC748-CAB2-0042-B9F3-3B52ABEE8ABE}" type="datetimeFigureOut">
               <a:rPr lang="en-US" smtClean="0"/>
-              <a:t>1/12/17</a:t>
+              <a:t>8/21/18</a:t>
             </a:fld>
             <a:endParaRPr lang="en-US"/>
           </a:p>
@@ -2080,10 +2080,9 @@
           </a:lstStyle>
           <a:p>
             <a:r>
-              <a:rPr lang="en-US" smtClean="0"/>
+              <a:rPr lang="en-US"/>
               <a:t>Click to edit Master title style</a:t>
             </a:r>
-            <a:endParaRPr lang="en-US"/>
           </a:p>
         </p:txBody>
       </p:sp>
@@ -2137,38 +2136,37 @@
           <a:p>
             <a:pPr lvl="0"/>
             <a:r>
-              <a:rPr lang="en-US" smtClean="0"/>
+              <a:rPr lang="en-US"/>
               <a:t>Click to edit Master text styles</a:t>
             </a:r>
           </a:p>
           <a:p>
             <a:pPr lvl="1"/>
             <a:r>
-              <a:rPr lang="en-US" smtClean="0"/>
+              <a:rPr lang="en-US"/>
               <a:t>Second level</a:t>
             </a:r>
           </a:p>
           <a:p>
             <a:pPr lvl="2"/>
             <a:r>
-              <a:rPr lang="en-US" smtClean="0"/>
+              <a:rPr lang="en-US"/>
               <a:t>Third level</a:t>
             </a:r>
           </a:p>
           <a:p>
             <a:pPr lvl="3"/>
             <a:r>
-              <a:rPr lang="en-US" smtClean="0"/>
+              <a:rPr lang="en-US"/>
               <a:t>Fourth level</a:t>
             </a:r>
           </a:p>
           <a:p>
             <a:pPr lvl="4"/>
             <a:r>
-              <a:rPr lang="en-US" smtClean="0"/>
+              <a:rPr lang="en-US"/>
               <a:t>Fifth level</a:t>
             </a:r>
-            <a:endParaRPr lang="en-US"/>
           </a:p>
         </p:txBody>
       </p:sp>
@@ -2231,7 +2229,7 @@
           <a:p>
             <a:pPr lvl="0"/>
             <a:r>
-              <a:rPr lang="en-US" smtClean="0"/>
+              <a:rPr lang="en-US"/>
               <a:t>Click to edit Master text styles</a:t>
             </a:r>
           </a:p>
@@ -2254,7 +2252,7 @@
           <a:p>
             <a:fld id="{569EC748-CAB2-0042-B9F3-3B52ABEE8ABE}" type="datetimeFigureOut">
               <a:rPr lang="en-US" smtClean="0"/>
-              <a:t>1/12/17</a:t>
+              <a:t>8/21/18</a:t>
             </a:fld>
             <a:endParaRPr lang="en-US"/>
           </a:p>
@@ -2357,10 +2355,9 @@
           </a:lstStyle>
           <a:p>
             <a:r>
-              <a:rPr lang="en-US" smtClean="0"/>
+              <a:rPr lang="en-US"/>
               <a:t>Click to edit Master title style</a:t>
             </a:r>
-            <a:endParaRPr lang="en-US"/>
           </a:p>
         </p:txBody>
       </p:sp>
@@ -2484,7 +2481,7 @@
           <a:p>
             <a:pPr lvl="0"/>
             <a:r>
-              <a:rPr lang="en-US" smtClean="0"/>
+              <a:rPr lang="en-US"/>
               <a:t>Click to edit Master text styles</a:t>
             </a:r>
           </a:p>
@@ -2507,7 +2504,7 @@
           <a:p>
             <a:fld id="{569EC748-CAB2-0042-B9F3-3B52ABEE8ABE}" type="datetimeFigureOut">
               <a:rPr lang="en-US" smtClean="0"/>
-              <a:t>1/12/17</a:t>
+              <a:t>8/21/18</a:t>
             </a:fld>
             <a:endParaRPr lang="en-US"/>
           </a:p>
@@ -2616,10 +2613,9 @@
           <a:lstStyle/>
           <a:p>
             <a:r>
-              <a:rPr lang="en-US" smtClean="0"/>
+              <a:rPr lang="en-US"/>
               <a:t>Click to edit Master title style</a:t>
             </a:r>
-            <a:endParaRPr lang="en-US"/>
           </a:p>
         </p:txBody>
       </p:sp>
@@ -2650,38 +2646,37 @@
           <a:p>
             <a:pPr lvl="0"/>
             <a:r>
-              <a:rPr lang="en-US" smtClean="0"/>
+              <a:rPr lang="en-US"/>
               <a:t>Click to edit Master text styles</a:t>
             </a:r>
           </a:p>
           <a:p>
             <a:pPr lvl="1"/>
             <a:r>
-              <a:rPr lang="en-US" smtClean="0"/>
+              <a:rPr lang="en-US"/>
               <a:t>Second level</a:t>
             </a:r>
           </a:p>
           <a:p>
             <a:pPr lvl="2"/>
             <a:r>
-              <a:rPr lang="en-US" smtClean="0"/>
+              <a:rPr lang="en-US"/>
               <a:t>Third level</a:t>
             </a:r>
           </a:p>
           <a:p>
             <a:pPr lvl="3"/>
             <a:r>
-              <a:rPr lang="en-US" smtClean="0"/>
+              <a:rPr lang="en-US"/>
               <a:t>Fourth level</a:t>
             </a:r>
           </a:p>
           <a:p>
             <a:pPr lvl="4"/>
             <a:r>
-              <a:rPr lang="en-US" smtClean="0"/>
+              <a:rPr lang="en-US"/>
               <a:t>Fifth level</a:t>
             </a:r>
-            <a:endParaRPr lang="en-US"/>
           </a:p>
         </p:txBody>
       </p:sp>
@@ -2720,7 +2715,7 @@
           <a:p>
             <a:fld id="{569EC748-CAB2-0042-B9F3-3B52ABEE8ABE}" type="datetimeFigureOut">
               <a:rPr lang="en-US" smtClean="0"/>
-              <a:t>1/12/17</a:t>
+              <a:t>8/21/18</a:t>
             </a:fld>
             <a:endParaRPr lang="en-US"/>
           </a:p>
@@ -3133,10 +3128,9 @@
           <a:p>
             <a:pPr algn="ctr"/>
             <a:r>
-              <a:rPr lang="en-US" sz="3600" b="1" dirty="0" smtClean="0"/>
+              <a:rPr lang="en-US" sz="3600" b="1" dirty="0"/>
               <a:t>CSC-210</a:t>
             </a:r>
-            <a:endParaRPr lang="en-US" sz="3600" b="1" dirty="0"/>
           </a:p>
         </p:txBody>
       </p:sp>
@@ -3178,10 +3172,9 @@
           <a:p>
             <a:pPr algn="ctr"/>
             <a:r>
-              <a:rPr lang="en-US" sz="3600" b="1" dirty="0" smtClean="0"/>
+              <a:rPr lang="en-US" sz="3600" b="1" dirty="0"/>
               <a:t>CSC-315</a:t>
             </a:r>
-            <a:endParaRPr lang="en-US" sz="3600" b="1" dirty="0"/>
           </a:p>
         </p:txBody>
       </p:sp>
@@ -3266,7 +3259,7 @@
           <a:p>
             <a:pPr algn="ctr"/>
             <a:r>
-              <a:rPr lang="en-US" sz="3600" b="1" smtClean="0"/>
+              <a:rPr lang="en-US" sz="3600" b="1"/>
               <a:t>CSC-450</a:t>
             </a:r>
             <a:endParaRPr lang="en-US" sz="3600" b="1" dirty="0"/>
@@ -3311,16 +3304,8 @@
           <a:p>
             <a:pPr algn="ctr"/>
             <a:r>
-              <a:rPr lang="en-US" sz="3600" b="1" dirty="0" smtClean="0"/>
-              <a:t>CSC</a:t>
-            </a:r>
-            <a:r>
-              <a:rPr lang="en-US" sz="3600" b="1" smtClean="0"/>
-              <a:t>-</a:t>
-            </a:r>
-            <a:r>
-              <a:rPr lang="en-US" sz="3600" b="1" smtClean="0"/>
-              <a:t>314</a:t>
+              <a:rPr lang="en-US" sz="3600" b="1"/>
+              <a:t>CSC-360</a:t>
             </a:r>
             <a:endParaRPr lang="en-US" sz="3600" b="1" dirty="0"/>
           </a:p>

</xml_diff>